<commit_message>
List of Assumptions doc added, final changes pushed up.
</commit_message>
<xml_diff>
--- a/ConceptualDesign/ConceptualDesignPresentation.pptx
+++ b/ConceptualDesign/ConceptualDesignPresentation.pptx
@@ -9,7 +9,7 @@
   </p:notesMasterIdLst>
   <p:sldIdLst>
     <p:sldId id="256" r:id="rId2"/>
-    <p:sldId id="257" r:id="rId3"/>
+    <p:sldId id="259" r:id="rId3"/>
     <p:sldId id="258" r:id="rId4"/>
   </p:sldIdLst>
   <p:sldSz cx="12192000" cy="6858000"/>
@@ -109,6 +109,11 @@
       </a:defRPr>
     </a:lvl9pPr>
   </p:defaultTextStyle>
+  <p:extLst>
+    <p:ext uri="{EFAFB233-063F-42B5-8137-9DF3F51BA10A}">
+      <p15:sldGuideLst xmlns:p15="http://schemas.microsoft.com/office/powerpoint/2012/main"/>
+    </p:ext>
+  </p:extLst>
 </p:presentation>
 </file>
 
@@ -463,90 +468,6 @@
 </file>
 
 <file path=ppt/notesSlides/notesSlide1.xml><?xml version="1.0" encoding="utf-8"?>
-<p:notes xmlns:a="http://schemas.openxmlformats.org/drawingml/2006/main" xmlns:r="http://schemas.openxmlformats.org/officeDocument/2006/relationships" xmlns:p="http://schemas.openxmlformats.org/presentationml/2006/main">
-  <p:cSld>
-    <p:spTree>
-      <p:nvGrpSpPr>
-        <p:cNvPr id="1" name=""/>
-        <p:cNvGrpSpPr/>
-        <p:nvPr/>
-      </p:nvGrpSpPr>
-      <p:grpSpPr>
-        <a:xfrm>
-          <a:off x="0" y="0"/>
-          <a:ext cx="0" cy="0"/>
-          <a:chOff x="0" y="0"/>
-          <a:chExt cx="0" cy="0"/>
-        </a:xfrm>
-      </p:grpSpPr>
-      <p:sp>
-        <p:nvSpPr>
-          <p:cNvPr id="2" name="Slide Image Placeholder 1"/>
-          <p:cNvSpPr>
-            <a:spLocks noGrp="1" noRot="1" noChangeAspect="1"/>
-          </p:cNvSpPr>
-          <p:nvPr>
-            <p:ph type="sldImg"/>
-          </p:nvPr>
-        </p:nvSpPr>
-        <p:spPr/>
-      </p:sp>
-      <p:sp>
-        <p:nvSpPr>
-          <p:cNvPr id="3" name="Notes Placeholder 2"/>
-          <p:cNvSpPr>
-            <a:spLocks noGrp="1"/>
-          </p:cNvSpPr>
-          <p:nvPr>
-            <p:ph type="body" idx="1"/>
-          </p:nvPr>
-        </p:nvSpPr>
-        <p:spPr/>
-        <p:txBody>
-          <a:bodyPr/>
-          <a:lstStyle/>
-          <a:p>
-            <a:endParaRPr lang="en-US" dirty="0"/>
-          </a:p>
-        </p:txBody>
-      </p:sp>
-      <p:sp>
-        <p:nvSpPr>
-          <p:cNvPr id="4" name="Slide Number Placeholder 3"/>
-          <p:cNvSpPr>
-            <a:spLocks noGrp="1"/>
-          </p:cNvSpPr>
-          <p:nvPr>
-            <p:ph type="sldNum" sz="quarter" idx="10"/>
-          </p:nvPr>
-        </p:nvSpPr>
-        <p:spPr/>
-        <p:txBody>
-          <a:bodyPr/>
-          <a:lstStyle/>
-          <a:p>
-            <a:fld id="{79DC2E7E-B343-A948-BF01-D60B81475C0C}" type="slidenum">
-              <a:rPr lang="en-US" smtClean="0"/>
-              <a:t>2</a:t>
-            </a:fld>
-            <a:endParaRPr lang="en-US"/>
-          </a:p>
-        </p:txBody>
-      </p:sp>
-    </p:spTree>
-    <p:extLst>
-      <p:ext uri="{BB962C8B-B14F-4D97-AF65-F5344CB8AC3E}">
-        <p14:creationId xmlns:p14="http://schemas.microsoft.com/office/powerpoint/2010/main" val="1241675261"/>
-      </p:ext>
-    </p:extLst>
-  </p:cSld>
-  <p:clrMapOvr>
-    <a:masterClrMapping/>
-  </p:clrMapOvr>
-</p:notes>
-</file>
-
-<file path=ppt/notesSlides/notesSlide2.xml><?xml version="1.0" encoding="utf-8"?>
 <p:notes xmlns:a="http://schemas.openxmlformats.org/drawingml/2006/main" xmlns:r="http://schemas.openxmlformats.org/officeDocument/2006/relationships" xmlns:p="http://schemas.openxmlformats.org/presentationml/2006/main">
   <p:cSld>
     <p:spTree>
@@ -4417,15 +4338,14 @@
         </p:nvSpPr>
         <p:spPr>
           <a:xfrm>
-            <a:off x="1371599" y="498764"/>
-            <a:ext cx="9601200" cy="872836"/>
+            <a:off x="1371600" y="638504"/>
+            <a:ext cx="9601200" cy="764628"/>
           </a:xfrm>
         </p:spPr>
         <p:txBody>
           <a:bodyPr/>
           <a:lstStyle/>
           <a:p>
-            <a:pPr algn="ctr"/>
             <a:r>
               <a:rPr lang="en-US" dirty="0" err="1" smtClean="0"/>
               <a:t>GeoSeek</a:t>
@@ -4440,16 +4360,16 @@
       </p:sp>
       <p:pic>
         <p:nvPicPr>
-          <p:cNvPr id="4" name="Content Placeholder 3"/>
+          <p:cNvPr id="5" name="Content Placeholder 4"/>
           <p:cNvPicPr>
             <a:picLocks noGrp="1" noChangeAspect="1"/>
           </p:cNvPicPr>
           <p:nvPr>
-            <p:ph idx="1"/>
+            <p:ph sz="half" idx="1"/>
           </p:nvPr>
         </p:nvPicPr>
         <p:blipFill>
-          <a:blip r:embed="rId3">
+          <a:blip r:embed="rId2">
             <a:extLst>
               <a:ext uri="{28A0092B-C50C-407E-A947-70E740481C1C}">
                 <a14:useLocalDpi xmlns:a14="http://schemas.microsoft.com/office/drawing/2010/main" val="0"/>
@@ -4462,30 +4382,143 @@
         </p:blipFill>
         <p:spPr>
           <a:xfrm>
-            <a:off x="1692365" y="1558925"/>
-            <a:ext cx="8959669" cy="4308475"/>
+            <a:off x="731661" y="1569327"/>
+            <a:ext cx="7802349" cy="3842883"/>
           </a:xfrm>
           <a:prstGeom prst="rect">
             <a:avLst/>
           </a:prstGeom>
-          <a:ln w="88900" cap="sq" cmpd="thickThin">
+          <a:ln w="127000" cap="sq">
             <a:solidFill>
-              <a:srgbClr val="000000"/>
+              <a:srgbClr val="181B0E"/>
             </a:solidFill>
-            <a:prstDash val="solid"/>
             <a:miter lim="800000"/>
           </a:ln>
           <a:effectLst>
-            <a:innerShdw blurRad="76200">
-              <a:srgbClr val="000000"/>
-            </a:innerShdw>
+            <a:outerShdw blurRad="57150" dist="50800" dir="2700000" algn="tl" rotWithShape="0">
+              <a:srgbClr val="000000">
+                <a:alpha val="40000"/>
+              </a:srgbClr>
+            </a:outerShdw>
           </a:effectLst>
         </p:spPr>
       </p:pic>
+      <p:sp>
+        <p:nvSpPr>
+          <p:cNvPr id="4" name="Content Placeholder 3"/>
+          <p:cNvSpPr>
+            <a:spLocks noGrp="1"/>
+          </p:cNvSpPr>
+          <p:nvPr>
+            <p:ph sz="half" idx="2"/>
+          </p:nvPr>
+        </p:nvSpPr>
+        <p:spPr>
+          <a:xfrm>
+            <a:off x="8655269" y="1450427"/>
+            <a:ext cx="3536731" cy="4416972"/>
+          </a:xfrm>
+        </p:spPr>
+        <p:txBody>
+          <a:bodyPr>
+            <a:normAutofit fontScale="85000" lnSpcReduction="20000"/>
+          </a:bodyPr>
+          <a:lstStyle/>
+          <a:p>
+            <a:pPr marL="0" indent="0" algn="ctr">
+              <a:buNone/>
+            </a:pPr>
+            <a:r>
+              <a:rPr lang="en-US" sz="2400" b="1" dirty="0" smtClean="0"/>
+              <a:t>LIST OF ASSUMPTIONS</a:t>
+            </a:r>
+          </a:p>
+          <a:p>
+            <a:r>
+              <a:rPr lang="en-US" dirty="0" smtClean="0"/>
+              <a:t>All </a:t>
+            </a:r>
+            <a:r>
+              <a:rPr lang="en-US" dirty="0" err="1"/>
+              <a:t>GeoSeek</a:t>
+            </a:r>
+            <a:r>
+              <a:rPr lang="en-US" dirty="0"/>
+              <a:t> Users have Android smartphones capable with the minimum requirements (running Android 4.4). All Android smartphones used by </a:t>
+            </a:r>
+            <a:r>
+              <a:rPr lang="en-US" dirty="0" err="1"/>
+              <a:t>GeoSeek</a:t>
+            </a:r>
+            <a:r>
+              <a:rPr lang="en-US" dirty="0"/>
+              <a:t> Users have cameras.</a:t>
+            </a:r>
+          </a:p>
+          <a:p>
+            <a:pPr lvl="0"/>
+            <a:r>
+              <a:rPr lang="en-US" dirty="0" err="1"/>
+              <a:t>GeoSeek</a:t>
+            </a:r>
+            <a:r>
+              <a:rPr lang="en-US" dirty="0"/>
+              <a:t> Users have smartphones that can capture Photo(s) during </a:t>
+            </a:r>
+            <a:r>
+              <a:rPr lang="en-US" dirty="0" err="1"/>
+              <a:t>GeoSeek</a:t>
+            </a:r>
+            <a:r>
+              <a:rPr lang="en-US" dirty="0"/>
+              <a:t> gameplay.</a:t>
+            </a:r>
+          </a:p>
+          <a:p>
+            <a:pPr lvl="0"/>
+            <a:r>
+              <a:rPr lang="en-US" dirty="0"/>
+              <a:t>Some </a:t>
+            </a:r>
+            <a:r>
+              <a:rPr lang="en-US" dirty="0" err="1"/>
+              <a:t>GeoSeek</a:t>
+            </a:r>
+            <a:r>
+              <a:rPr lang="en-US" dirty="0"/>
+              <a:t> Users will play anonymously (non-Guild) play. All Geo-Seek Users capable of anonymous play are able to join a </a:t>
+            </a:r>
+            <a:r>
+              <a:rPr lang="en-US" dirty="0" err="1"/>
+              <a:t>GeoSeek</a:t>
+            </a:r>
+            <a:r>
+              <a:rPr lang="en-US" dirty="0"/>
+              <a:t> Guild.</a:t>
+            </a:r>
+          </a:p>
+          <a:p>
+            <a:pPr lvl="0"/>
+            <a:r>
+              <a:rPr lang="en-US" dirty="0" err="1"/>
+              <a:t>GeoSeek</a:t>
+            </a:r>
+            <a:r>
+              <a:rPr lang="en-US" dirty="0"/>
+              <a:t> Users can </a:t>
+            </a:r>
+            <a:r>
+              <a:rPr lang="en-US" dirty="0" smtClean="0"/>
+              <a:t>only join one Guild.</a:t>
+            </a:r>
+            <a:endParaRPr lang="en-US" dirty="0"/>
+          </a:p>
+        </p:txBody>
+      </p:sp>
     </p:spTree>
     <p:extLst>
       <p:ext uri="{BB962C8B-B14F-4D97-AF65-F5344CB8AC3E}">
-        <p14:creationId xmlns:p14="http://schemas.microsoft.com/office/powerpoint/2010/main" val="474413455"/>
+        <p14:creationId xmlns:p14="http://schemas.microsoft.com/office/powerpoint/2010/main" val="679591129"/>
       </p:ext>
     </p:extLst>
   </p:cSld>

</xml_diff>